<commit_message>
[FIXED] global gain [FIXED] UDP IP [ADD] LED Service
</commit_message>
<xml_diff>
--- a/Info/MicroEEG以太网版通讯协议v1.4.pptx
+++ b/Info/MicroEEG以太网版通讯协议v1.4.pptx
@@ -398,7 +398,7 @@
           <a:p>
             <a:fld id="{78351125-25EA-457C-9E7F-8C514A1591BE}" type="datetimeFigureOut">
               <a:rPr lang="zh-CN" altLang="en-US" smtClean="0"/>
-              <a:t>2020/12/1</a:t>
+              <a:t>2021/1/17</a:t>
             </a:fld>
             <a:endParaRPr lang="zh-CN" altLang="en-US"/>
           </a:p>
@@ -1304,7 +1304,7 @@
           <a:p>
             <a:fld id="{69BB2B35-312D-43AF-985A-2584D97C06B1}" type="datetimeFigureOut">
               <a:rPr lang="zh-CN" altLang="en-US" smtClean="0"/>
-              <a:t>2020/12/1</a:t>
+              <a:t>2021/1/17</a:t>
             </a:fld>
             <a:endParaRPr lang="zh-CN" altLang="en-US"/>
           </a:p>
@@ -1474,7 +1474,7 @@
           <a:p>
             <a:fld id="{69BB2B35-312D-43AF-985A-2584D97C06B1}" type="datetimeFigureOut">
               <a:rPr lang="zh-CN" altLang="en-US" smtClean="0"/>
-              <a:t>2020/12/1</a:t>
+              <a:t>2021/1/17</a:t>
             </a:fld>
             <a:endParaRPr lang="zh-CN" altLang="en-US"/>
           </a:p>
@@ -1654,7 +1654,7 @@
           <a:p>
             <a:fld id="{69BB2B35-312D-43AF-985A-2584D97C06B1}" type="datetimeFigureOut">
               <a:rPr lang="zh-CN" altLang="en-US" smtClean="0"/>
-              <a:t>2020/12/1</a:t>
+              <a:t>2021/1/17</a:t>
             </a:fld>
             <a:endParaRPr lang="zh-CN" altLang="en-US"/>
           </a:p>
@@ -1824,7 +1824,7 @@
           <a:p>
             <a:fld id="{69BB2B35-312D-43AF-985A-2584D97C06B1}" type="datetimeFigureOut">
               <a:rPr lang="zh-CN" altLang="en-US" smtClean="0"/>
-              <a:t>2020/12/1</a:t>
+              <a:t>2021/1/17</a:t>
             </a:fld>
             <a:endParaRPr lang="zh-CN" altLang="en-US"/>
           </a:p>
@@ -2070,7 +2070,7 @@
           <a:p>
             <a:fld id="{69BB2B35-312D-43AF-985A-2584D97C06B1}" type="datetimeFigureOut">
               <a:rPr lang="zh-CN" altLang="en-US" smtClean="0"/>
-              <a:t>2020/12/1</a:t>
+              <a:t>2021/1/17</a:t>
             </a:fld>
             <a:endParaRPr lang="zh-CN" altLang="en-US"/>
           </a:p>
@@ -2302,7 +2302,7 @@
           <a:p>
             <a:fld id="{69BB2B35-312D-43AF-985A-2584D97C06B1}" type="datetimeFigureOut">
               <a:rPr lang="zh-CN" altLang="en-US" smtClean="0"/>
-              <a:t>2020/12/1</a:t>
+              <a:t>2021/1/17</a:t>
             </a:fld>
             <a:endParaRPr lang="zh-CN" altLang="en-US"/>
           </a:p>
@@ -2669,7 +2669,7 @@
           <a:p>
             <a:fld id="{69BB2B35-312D-43AF-985A-2584D97C06B1}" type="datetimeFigureOut">
               <a:rPr lang="zh-CN" altLang="en-US" smtClean="0"/>
-              <a:t>2020/12/1</a:t>
+              <a:t>2021/1/17</a:t>
             </a:fld>
             <a:endParaRPr lang="zh-CN" altLang="en-US"/>
           </a:p>
@@ -2787,7 +2787,7 @@
           <a:p>
             <a:fld id="{69BB2B35-312D-43AF-985A-2584D97C06B1}" type="datetimeFigureOut">
               <a:rPr lang="zh-CN" altLang="en-US" smtClean="0"/>
-              <a:t>2020/12/1</a:t>
+              <a:t>2021/1/17</a:t>
             </a:fld>
             <a:endParaRPr lang="zh-CN" altLang="en-US"/>
           </a:p>
@@ -2882,7 +2882,7 @@
           <a:p>
             <a:fld id="{69BB2B35-312D-43AF-985A-2584D97C06B1}" type="datetimeFigureOut">
               <a:rPr lang="zh-CN" altLang="en-US" smtClean="0"/>
-              <a:t>2020/12/1</a:t>
+              <a:t>2021/1/17</a:t>
             </a:fld>
             <a:endParaRPr lang="zh-CN" altLang="en-US"/>
           </a:p>
@@ -3159,7 +3159,7 @@
           <a:p>
             <a:fld id="{69BB2B35-312D-43AF-985A-2584D97C06B1}" type="datetimeFigureOut">
               <a:rPr lang="zh-CN" altLang="en-US" smtClean="0"/>
-              <a:t>2020/12/1</a:t>
+              <a:t>2021/1/17</a:t>
             </a:fld>
             <a:endParaRPr lang="zh-CN" altLang="en-US"/>
           </a:p>
@@ -3416,7 +3416,7 @@
           <a:p>
             <a:fld id="{69BB2B35-312D-43AF-985A-2584D97C06B1}" type="datetimeFigureOut">
               <a:rPr lang="zh-CN" altLang="en-US" smtClean="0"/>
-              <a:t>2020/12/1</a:t>
+              <a:t>2021/1/17</a:t>
             </a:fld>
             <a:endParaRPr lang="zh-CN" altLang="en-US"/>
           </a:p>
@@ -3629,7 +3629,7 @@
           <a:p>
             <a:fld id="{69BB2B35-312D-43AF-985A-2584D97C06B1}" type="datetimeFigureOut">
               <a:rPr lang="zh-CN" altLang="en-US" smtClean="0"/>
-              <a:t>2020/12/1</a:t>
+              <a:t>2021/1/17</a:t>
             </a:fld>
             <a:endParaRPr lang="zh-CN" altLang="en-US"/>
           </a:p>
@@ -4168,7 +4168,7 @@
                 <a:latin typeface="微软雅黑" panose="020B0503020204020204" pitchFamily="34" charset="-122"/>
                 <a:ea typeface="微软雅黑" panose="020B0503020204020204" pitchFamily="34" charset="-122"/>
               </a:rPr>
-              <a:t>v1.4</a:t>
+              <a:t>v1.41</a:t>
             </a:r>
             <a:endParaRPr lang="zh-CN" altLang="en-US" sz="4800" dirty="0">
               <a:solidFill>
@@ -4316,7 +4316,7 @@
                   <a:srgbClr val="00498E"/>
                 </a:solidFill>
               </a:rPr>
-              <a:t>version - 1.4</a:t>
+              <a:t>version - 1.41</a:t>
             </a:r>
           </a:p>
           <a:p>
@@ -10788,7 +10788,7 @@
         <p:spPr>
           <a:xfrm>
             <a:off x="144780" y="738124"/>
-            <a:ext cx="3250550" cy="1691104"/>
+            <a:ext cx="3250550" cy="1921936"/>
           </a:xfrm>
           <a:prstGeom prst="rect">
             <a:avLst/>
@@ -10975,6 +10975,52 @@
                 </a:solidFill>
               </a:rPr>
               <a:t>version - 1.4	</a:t>
+            </a:r>
+            <a:r>
+              <a:rPr lang="en-US" altLang="zh-CN" sz="1200" dirty="0" err="1">
+                <a:solidFill>
+                  <a:srgbClr val="00498E"/>
+                </a:solidFill>
+              </a:rPr>
+              <a:t>gjm_silly</a:t>
+            </a:r>
+            <a:endParaRPr lang="en-US" altLang="zh-CN" sz="1200" dirty="0">
+              <a:solidFill>
+                <a:srgbClr val="00498E"/>
+              </a:solidFill>
+            </a:endParaRPr>
+          </a:p>
+          <a:p>
+            <a:pPr marL="171450" indent="-171450">
+              <a:lnSpc>
+                <a:spcPct val="125000"/>
+              </a:lnSpc>
+              <a:buFont typeface="Arial" panose="020B0604020202020204" pitchFamily="34" charset="0"/>
+              <a:buChar char="•"/>
+            </a:pPr>
+            <a:r>
+              <a:rPr lang="en-US" altLang="zh-CN" sz="1200" b="1">
+                <a:solidFill>
+                  <a:srgbClr val="00498E"/>
+                </a:solidFill>
+              </a:rPr>
+              <a:t>2021.01.17</a:t>
+            </a:r>
+            <a:r>
+              <a:rPr lang="en-US" altLang="zh-CN" sz="1200" b="1" dirty="0">
+                <a:solidFill>
+                  <a:srgbClr val="00498E"/>
+                </a:solidFill>
+              </a:rPr>
+              <a:t>	</a:t>
+            </a:r>
+            <a:r>
+              <a:rPr lang="en-US" altLang="zh-CN" sz="1200" dirty="0">
+                <a:solidFill>
+                  <a:srgbClr val="00498E"/>
+                </a:solidFill>
+              </a:rPr>
+              <a:t>version - 1.41	</a:t>
             </a:r>
             <a:r>
               <a:rPr lang="en-US" altLang="zh-CN" sz="1200" dirty="0" err="1">
@@ -21067,7 +21113,7 @@
           <p:nvPr>
             <p:extLst>
               <p:ext uri="{D42A27DB-BD31-4B8C-83A1-F6EECF244321}">
-                <p14:modId xmlns:p14="http://schemas.microsoft.com/office/powerpoint/2010/main" val="777329188"/>
+                <p14:modId xmlns:p14="http://schemas.microsoft.com/office/powerpoint/2010/main" val="522952589"/>
               </p:ext>
             </p:extLst>
           </p:nvPr>
@@ -24778,7 +24824,7 @@
                       </a:r>
                       <a:r>
                         <a:rPr lang="en-US" altLang="zh-CN" sz="1200" dirty="0"/>
-                        <a:t>1/2/4/6</a:t>
+                        <a:t>1/2/4/6/8/12/24</a:t>
                       </a:r>
                       <a:endParaRPr lang="zh-CN" altLang="en-US" sz="1200" dirty="0"/>
                     </a:p>

</xml_diff>